<commit_message>
typos corrected in week 9
</commit_message>
<xml_diff>
--- a/Lectures2024/CITS5503WebArchDesign_week9.pptx
+++ b/Lectures2024/CITS5503WebArchDesign_week9.pptx
@@ -278,10 +278,25 @@
   <pc:docChgLst>
     <pc:chgData name="张 智" userId="36bdf691fd3510be" providerId="LiveId" clId="{A0230E69-6A6F-4092-88C0-D25F355B2615}"/>
     <pc:docChg chg="undo redo custSel addSld delSld modSld sldOrd">
-      <pc:chgData name="张 智" userId="36bdf691fd3510be" providerId="LiveId" clId="{A0230E69-6A6F-4092-88C0-D25F355B2615}" dt="2024-09-24T03:17:00.156" v="24228" actId="20577"/>
+      <pc:chgData name="张 智" userId="36bdf691fd3510be" providerId="LiveId" clId="{A0230E69-6A6F-4092-88C0-D25F355B2615}" dt="2024-09-24T06:17:56.869" v="24536" actId="20577"/>
       <pc:docMkLst>
         <pc:docMk/>
       </pc:docMkLst>
+      <pc:sldChg chg="modSp mod">
+        <pc:chgData name="张 智" userId="36bdf691fd3510be" providerId="LiveId" clId="{A0230E69-6A6F-4092-88C0-D25F355B2615}" dt="2024-09-24T05:44:14.231" v="24270" actId="20577"/>
+        <pc:sldMkLst>
+          <pc:docMk/>
+          <pc:sldMk cId="201535397" sldId="1357"/>
+        </pc:sldMkLst>
+        <pc:spChg chg="mod">
+          <ac:chgData name="张 智" userId="36bdf691fd3510be" providerId="LiveId" clId="{A0230E69-6A6F-4092-88C0-D25F355B2615}" dt="2024-09-24T05:44:14.231" v="24270" actId="20577"/>
+          <ac:spMkLst>
+            <pc:docMk/>
+            <pc:sldMk cId="201535397" sldId="1357"/>
+            <ac:spMk id="2" creationId="{4D81C55C-64EF-5A4C-AA55-00ED127F3859}"/>
+          </ac:spMkLst>
+        </pc:spChg>
+      </pc:sldChg>
       <pc:sldChg chg="modSp mod modNotesTx">
         <pc:chgData name="张 智" userId="36bdf691fd3510be" providerId="LiveId" clId="{A0230E69-6A6F-4092-88C0-D25F355B2615}" dt="2024-09-24T02:00:13.653" v="22824" actId="113"/>
         <pc:sldMkLst>
@@ -463,7 +478,7 @@
         </pc:spChg>
       </pc:sldChg>
       <pc:sldChg chg="addSp delSp modSp mod modNotes modNotesTx">
-        <pc:chgData name="张 智" userId="36bdf691fd3510be" providerId="LiveId" clId="{A0230E69-6A6F-4092-88C0-D25F355B2615}" dt="2024-09-24T02:27:41.590" v="23358" actId="27636"/>
+        <pc:chgData name="张 智" userId="36bdf691fd3510be" providerId="LiveId" clId="{A0230E69-6A6F-4092-88C0-D25F355B2615}" dt="2024-09-24T06:14:34.857" v="24496" actId="20577"/>
         <pc:sldMkLst>
           <pc:docMk/>
           <pc:sldMk cId="3266059179" sldId="1466"/>
@@ -540,12 +555,28 @@
           </ac:spMkLst>
         </pc:spChg>
       </pc:sldChg>
-      <pc:sldChg chg="add modNotesTx">
-        <pc:chgData name="张 智" userId="36bdf691fd3510be" providerId="LiveId" clId="{A0230E69-6A6F-4092-88C0-D25F355B2615}" dt="2024-09-24T01:37:33.591" v="22475" actId="20577"/>
+      <pc:sldChg chg="modSp add mod modNotesTx">
+        <pc:chgData name="张 智" userId="36bdf691fd3510be" providerId="LiveId" clId="{A0230E69-6A6F-4092-88C0-D25F355B2615}" dt="2024-09-24T06:17:56.869" v="24536" actId="20577"/>
         <pc:sldMkLst>
           <pc:docMk/>
           <pc:sldMk cId="4113656893" sldId="1467"/>
         </pc:sldMkLst>
+        <pc:spChg chg="mod">
+          <ac:chgData name="张 智" userId="36bdf691fd3510be" providerId="LiveId" clId="{A0230E69-6A6F-4092-88C0-D25F355B2615}" dt="2024-09-24T06:17:28.057" v="24501" actId="20577"/>
+          <ac:spMkLst>
+            <pc:docMk/>
+            <pc:sldMk cId="4113656893" sldId="1467"/>
+            <ac:spMk id="6" creationId="{B2FFB231-BD71-49E7-8FDE-300DD980193A}"/>
+          </ac:spMkLst>
+        </pc:spChg>
+        <pc:spChg chg="mod">
+          <ac:chgData name="张 智" userId="36bdf691fd3510be" providerId="LiveId" clId="{A0230E69-6A6F-4092-88C0-D25F355B2615}" dt="2024-09-24T06:17:31.777" v="24505" actId="20577"/>
+          <ac:spMkLst>
+            <pc:docMk/>
+            <pc:sldMk cId="4113656893" sldId="1467"/>
+            <ac:spMk id="7" creationId="{F50ADC2D-D61B-43FC-8924-7E4600DCDB96}"/>
+          </ac:spMkLst>
+        </pc:spChg>
       </pc:sldChg>
       <pc:sldChg chg="addSp delSp modSp mod modNotesTx">
         <pc:chgData name="张 智" userId="36bdf691fd3510be" providerId="LiveId" clId="{A0230E69-6A6F-4092-88C0-D25F355B2615}" dt="2024-09-24T01:44:26.879" v="22588" actId="20577"/>
@@ -1051,7 +1082,7 @@
         </pc:spChg>
       </pc:sldChg>
       <pc:sldChg chg="modSp mod modNotesTx">
-        <pc:chgData name="张 智" userId="36bdf691fd3510be" providerId="LiveId" clId="{A0230E69-6A6F-4092-88C0-D25F355B2615}" dt="2024-09-20T05:45:07.132" v="998" actId="20577"/>
+        <pc:chgData name="张 智" userId="36bdf691fd3510be" providerId="LiveId" clId="{A0230E69-6A6F-4092-88C0-D25F355B2615}" dt="2024-09-24T05:01:19.808" v="24250"/>
         <pc:sldMkLst>
           <pc:docMk/>
           <pc:sldMk cId="927204106" sldId="1494"/>
@@ -1066,14 +1097,14 @@
         </pc:spChg>
       </pc:sldChg>
       <pc:sldChg chg="modNotesTx">
-        <pc:chgData name="张 智" userId="36bdf691fd3510be" providerId="LiveId" clId="{A0230E69-6A6F-4092-88C0-D25F355B2615}" dt="2024-09-23T01:44:12.772" v="12950" actId="20577"/>
+        <pc:chgData name="张 智" userId="36bdf691fd3510be" providerId="LiveId" clId="{A0230E69-6A6F-4092-88C0-D25F355B2615}" dt="2024-09-24T04:56:57.331" v="24238" actId="20577"/>
         <pc:sldMkLst>
           <pc:docMk/>
           <pc:sldMk cId="2470940641" sldId="1496"/>
         </pc:sldMkLst>
       </pc:sldChg>
       <pc:sldChg chg="modSp mod modNotesTx">
-        <pc:chgData name="张 智" userId="36bdf691fd3510be" providerId="LiveId" clId="{A0230E69-6A6F-4092-88C0-D25F355B2615}" dt="2024-09-23T01:49:07.245" v="13052" actId="20577"/>
+        <pc:chgData name="张 智" userId="36bdf691fd3510be" providerId="LiveId" clId="{A0230E69-6A6F-4092-88C0-D25F355B2615}" dt="2024-09-24T05:01:35.276" v="24254" actId="20577"/>
         <pc:sldMkLst>
           <pc:docMk/>
           <pc:sldMk cId="4041780930" sldId="1498"/>
@@ -1103,7 +1134,7 @@
         </pc:spChg>
       </pc:sldChg>
       <pc:sldChg chg="modSp mod modNotesTx">
-        <pc:chgData name="张 智" userId="36bdf691fd3510be" providerId="LiveId" clId="{A0230E69-6A6F-4092-88C0-D25F355B2615}" dt="2024-09-23T14:29:59.638" v="22012" actId="20577"/>
+        <pc:chgData name="张 智" userId="36bdf691fd3510be" providerId="LiveId" clId="{A0230E69-6A6F-4092-88C0-D25F355B2615}" dt="2024-09-24T05:53:04.818" v="24328" actId="20577"/>
         <pc:sldMkLst>
           <pc:docMk/>
           <pc:sldMk cId="1041755705" sldId="1501"/>
@@ -1141,7 +1172,7 @@
         </pc:spChg>
       </pc:sldChg>
       <pc:sldChg chg="modSp mod modNotesTx">
-        <pc:chgData name="张 智" userId="36bdf691fd3510be" providerId="LiveId" clId="{A0230E69-6A6F-4092-88C0-D25F355B2615}" dt="2024-09-23T14:38:00.024" v="22057" actId="20577"/>
+        <pc:chgData name="张 智" userId="36bdf691fd3510be" providerId="LiveId" clId="{A0230E69-6A6F-4092-88C0-D25F355B2615}" dt="2024-09-24T05:14:50.455" v="24262" actId="20577"/>
         <pc:sldMkLst>
           <pc:docMk/>
           <pc:sldMk cId="2067913887" sldId="1503"/>
@@ -1720,7 +1751,7 @@
         </pc:picChg>
       </pc:sldChg>
       <pc:sldChg chg="addSp modSp add mod modNotesTx">
-        <pc:chgData name="张 智" userId="36bdf691fd3510be" providerId="LiveId" clId="{A0230E69-6A6F-4092-88C0-D25F355B2615}" dt="2024-09-23T14:32:59.807" v="22028" actId="20577"/>
+        <pc:chgData name="张 智" userId="36bdf691fd3510be" providerId="LiveId" clId="{A0230E69-6A6F-4092-88C0-D25F355B2615}" dt="2024-09-24T05:57:07.421" v="24426" actId="20577"/>
         <pc:sldMkLst>
           <pc:docMk/>
           <pc:sldMk cId="1324393746" sldId="1532"/>
@@ -20237,7 +20268,7 @@
                   <a:schemeClr val="bg2"/>
                 </a:solidFill>
               </a:rPr>
-              <a:t>Architecture and Design</a:t>
+              <a:t>Architecture and Design Pattern</a:t>
             </a:r>
           </a:p>
         </p:txBody>
@@ -25449,7 +25480,7 @@
         <p:spPr>
           <a:xfrm>
             <a:off x="1863306" y="1313289"/>
-            <a:ext cx="8717604" cy="2246769"/>
+            <a:ext cx="8717604" cy="1877437"/>
           </a:xfrm>
           <a:prstGeom prst="rect">
             <a:avLst/>
@@ -25490,7 +25521,7 @@
               <a:rPr lang="en-US" dirty="0">
                 <a:latin typeface="Courier"/>
               </a:rPr>
-              <a:t> import render, redirect </a:t>
+              <a:t> import render</a:t>
             </a:r>
           </a:p>
           <a:p>
@@ -25502,41 +25533,8 @@
               <a:rPr lang="en-US" dirty="0">
                 <a:latin typeface="Courier"/>
               </a:rPr>
-              <a:t>from </a:t>
-            </a:r>
-            <a:r>
-              <a:rPr lang="en-US" dirty="0" err="1">
-                <a:latin typeface="Courier"/>
-              </a:rPr>
-              <a:t>django.http</a:t>
-            </a:r>
-            <a:r>
-              <a:rPr lang="en-US" dirty="0">
-                <a:latin typeface="Courier"/>
-              </a:rPr>
-              <a:t> import </a:t>
-            </a:r>
-            <a:r>
-              <a:rPr lang="en-US" dirty="0" err="1">
-                <a:latin typeface="Courier"/>
-              </a:rPr>
-              <a:t>HttpResponse</a:t>
-            </a:r>
-            <a:r>
-              <a:rPr lang="en-US" dirty="0">
-                <a:latin typeface="Courier"/>
-              </a:rPr>
               <a:t> </a:t>
             </a:r>
-          </a:p>
-          <a:p>
-            <a:pPr algn="l">
-              <a:buFont typeface="+mj-lt"/>
-              <a:buNone/>
-            </a:pPr>
-            <a:endParaRPr lang="en-US" dirty="0">
-              <a:latin typeface="Courier"/>
-            </a:endParaRPr>
           </a:p>
           <a:p>
             <a:pPr algn="l">
@@ -25591,7 +25589,7 @@
         <p:spPr>
           <a:xfrm>
             <a:off x="1304138" y="1313289"/>
-            <a:ext cx="559168" cy="2246769"/>
+            <a:ext cx="559168" cy="1877437"/>
           </a:xfrm>
           <a:prstGeom prst="rect">
             <a:avLst/>
@@ -25654,15 +25652,6 @@
                 <a:latin typeface="Courier" pitchFamily="2" charset="0"/>
               </a:rPr>
               <a:t>5</a:t>
-            </a:r>
-          </a:p>
-          <a:p>
-            <a:pPr marL="49213" lvl="2" algn="l"/>
-            <a:r>
-              <a:rPr lang="en-US" dirty="0">
-                <a:latin typeface="Courier" pitchFamily="2" charset="0"/>
-              </a:rPr>
-              <a:t>6</a:t>
             </a:r>
           </a:p>
         </p:txBody>

</xml_diff>